<commit_message>
wordsearch maker add scramble
</commit_message>
<xml_diff>
--- a/template_for_dobble_cards.pptx
+++ b/template_for_dobble_cards.pptx
@@ -429,7 +429,7 @@
         </p:nvSpPr>
         <p:spPr>
           <a:xfrm rot="16200000">
-            <a:off x="6014060" y="288626"/>
+            <a:off x="6014060" y="3149769"/>
             <a:ext cx="2700000" cy="2700000"/>
           </a:xfrm>
         </p:spPr>
@@ -459,7 +459,7 @@
         </p:nvSpPr>
         <p:spPr>
           <a:xfrm rot="5400000">
-            <a:off x="285480" y="6010912"/>
+            <a:off x="285477" y="3149769"/>
             <a:ext cx="2700000" cy="2700000"/>
           </a:xfrm>
         </p:spPr>
@@ -489,7 +489,7 @@
         </p:nvSpPr>
         <p:spPr>
           <a:xfrm rot="10800000">
-            <a:off x="285478" y="288626"/>
+            <a:off x="3149769" y="218288"/>
             <a:ext cx="2700000" cy="2700000"/>
           </a:xfrm>
         </p:spPr>
@@ -518,8 +518,8 @@
           </p:nvPr>
         </p:nvSpPr>
         <p:spPr>
-          <a:xfrm rot="16200000">
-            <a:off x="6014060" y="6010912"/>
+          <a:xfrm>
+            <a:off x="3149769" y="6081250"/>
             <a:ext cx="2700000" cy="2700000"/>
           </a:xfrm>
         </p:spPr>
@@ -1766,7 +1766,7 @@
           <a:p>
             <a:fld id="{032F1F5B-458B-48DB-9330-0D5E450E477F}" type="datetimeFigureOut">
               <a:rPr lang="ko-KR" altLang="en-US" smtClean="0"/>
-              <a:t>2018. 9. 15.</a:t>
+              <a:t>2018. 9. 16.</a:t>
             </a:fld>
             <a:endParaRPr lang="ko-KR" altLang="en-US"/>
           </a:p>

</xml_diff>